<commit_message>
changed 'is not' for equality as that could get you into trouble as it is not strictly an equality operator
</commit_message>
<xml_diff>
--- a/python/presentations/learning_python/06_ceda-and-or-not.pptx
+++ b/python/presentations/learning_python/06_ceda-and-or-not.pptx
@@ -278,7 +278,7 @@
               <a:pPr>
                 <a:defRPr/>
               </a:pPr>
-              <a:t>09/10/2018</a:t>
+              <a:t>15/10/2021</a:t>
             </a:fld>
             <a:endParaRPr lang="en-GB"/>
           </a:p>
@@ -364,6 +364,11 @@
         </p:txBody>
       </p:sp>
     </p:spTree>
+    <p:extLst>
+      <p:ext uri="{BB962C8B-B14F-4D97-AF65-F5344CB8AC3E}">
+        <p14:creationId xmlns:p14="http://schemas.microsoft.com/office/powerpoint/2010/main" val="1"/>
+      </p:ext>
+    </p:extLst>
   </p:cSld>
   <p:clrMap bg1="lt1" tx1="dk1" bg2="lt2" tx2="dk2" accent1="accent1" accent2="accent2" accent3="accent3" accent4="accent4" accent5="accent5" accent6="accent6" hlink="hlink" folHlink="folHlink"/>
 </p:handoutMaster>
@@ -469,7 +474,7 @@
               <a:pPr>
                 <a:defRPr/>
               </a:pPr>
-              <a:t>09/10/2018</a:t>
+              <a:t>15/10/2021</a:t>
             </a:fld>
             <a:endParaRPr lang="en-GB"/>
           </a:p>
@@ -505,7 +510,7 @@
           <a:lstStyle/>
           <a:p>
             <a:pPr lvl="0"/>
-            <a:endParaRPr lang="en-GB" noProof="0" smtClean="0"/>
+            <a:endParaRPr lang="en-GB" noProof="0"/>
           </a:p>
         </p:txBody>
       </p:sp>
@@ -534,38 +539,38 @@
           <a:p>
             <a:pPr lvl="0"/>
             <a:r>
-              <a:rPr lang="en-US" noProof="0" smtClean="0"/>
+              <a:rPr lang="en-US" noProof="0"/>
               <a:t>Click to edit Master text styles</a:t>
             </a:r>
           </a:p>
           <a:p>
             <a:pPr lvl="1"/>
             <a:r>
-              <a:rPr lang="en-US" noProof="0" smtClean="0"/>
+              <a:rPr lang="en-US" noProof="0"/>
               <a:t>Second level</a:t>
             </a:r>
           </a:p>
           <a:p>
             <a:pPr lvl="2"/>
             <a:r>
-              <a:rPr lang="en-US" noProof="0" smtClean="0"/>
+              <a:rPr lang="en-US" noProof="0"/>
               <a:t>Third level</a:t>
             </a:r>
           </a:p>
           <a:p>
             <a:pPr lvl="3"/>
             <a:r>
-              <a:rPr lang="en-US" noProof="0" smtClean="0"/>
+              <a:rPr lang="en-US" noProof="0"/>
               <a:t>Fourth level</a:t>
             </a:r>
           </a:p>
           <a:p>
             <a:pPr lvl="4"/>
             <a:r>
-              <a:rPr lang="en-US" noProof="0" smtClean="0"/>
+              <a:rPr lang="en-US" noProof="0"/>
               <a:t>Fifth level</a:t>
             </a:r>
-            <a:endParaRPr lang="en-GB" noProof="0" smtClean="0"/>
+            <a:endParaRPr lang="en-GB" noProof="0"/>
           </a:p>
         </p:txBody>
       </p:sp>
@@ -992,7 +997,7 @@
           </a:lstStyle>
           <a:p>
             <a:r>
-              <a:rPr lang="en-US" smtClean="0"/>
+              <a:rPr lang="en-US"/>
               <a:t>Click to edit Master title style</a:t>
             </a:r>
             <a:endParaRPr lang="en-US" dirty="0"/>
@@ -1068,7 +1073,7 @@
           </a:lstStyle>
           <a:p>
             <a:r>
-              <a:rPr lang="en-US" smtClean="0"/>
+              <a:rPr lang="en-US"/>
               <a:t>Click to edit Master subtitle style</a:t>
             </a:r>
             <a:endParaRPr lang="en-US" dirty="0"/>
@@ -1137,7 +1142,7 @@
           </a:lstStyle>
           <a:p>
             <a:r>
-              <a:rPr lang="en-US" smtClean="0"/>
+              <a:rPr lang="en-US"/>
               <a:t>Click to edit Master title style</a:t>
             </a:r>
             <a:endParaRPr lang="en-US" dirty="0"/>
@@ -1211,7 +1216,7 @@
           </a:lstStyle>
           <a:p>
             <a:r>
-              <a:rPr lang="en-US" smtClean="0"/>
+              <a:rPr lang="en-US"/>
               <a:t>Click to edit Master subtitle style</a:t>
             </a:r>
             <a:endParaRPr lang="en-US" dirty="0"/>
@@ -1258,7 +1263,7 @@
           <a:p>
             <a:pPr lvl="0"/>
             <a:r>
-              <a:rPr lang="en-US" noProof="0" smtClean="0"/>
+              <a:rPr lang="en-US" noProof="0"/>
               <a:t>Click icon to add picture</a:t>
             </a:r>
             <a:endParaRPr lang="en-GB" noProof="0" dirty="0"/>
@@ -1306,7 +1311,7 @@
               <a:pPr>
                 <a:defRPr/>
               </a:pPr>
-              <a:t>09/10/2018</a:t>
+              <a:t>15/10/2021</a:t>
             </a:fld>
             <a:endParaRPr lang="en-GB" dirty="0"/>
           </a:p>
@@ -1374,7 +1379,7 @@
           </a:lstStyle>
           <a:p>
             <a:r>
-              <a:rPr lang="en-US" smtClean="0"/>
+              <a:rPr lang="en-US"/>
               <a:t>Click to edit Master title style</a:t>
             </a:r>
             <a:endParaRPr lang="en-US" dirty="0"/>
@@ -1448,7 +1453,7 @@
           </a:lstStyle>
           <a:p>
             <a:r>
-              <a:rPr lang="en-US" smtClean="0"/>
+              <a:rPr lang="en-US"/>
               <a:t>Click to edit Master subtitle style</a:t>
             </a:r>
             <a:endParaRPr lang="en-US" dirty="0"/>
@@ -1495,7 +1500,7 @@
           <a:p>
             <a:pPr lvl="0"/>
             <a:r>
-              <a:rPr lang="en-US" noProof="0" smtClean="0"/>
+              <a:rPr lang="en-US" noProof="0"/>
               <a:t>Click icon to add picture</a:t>
             </a:r>
             <a:endParaRPr lang="en-GB" noProof="0" dirty="0"/>
@@ -1543,7 +1548,7 @@
               <a:pPr>
                 <a:defRPr/>
               </a:pPr>
-              <a:t>09/10/2018</a:t>
+              <a:t>15/10/2021</a:t>
             </a:fld>
             <a:endParaRPr lang="en-GB" dirty="0"/>
           </a:p>
@@ -1646,7 +1651,7 @@
           </a:lstStyle>
           <a:p>
             <a:r>
-              <a:rPr lang="en-US" smtClean="0"/>
+              <a:rPr lang="en-US"/>
               <a:t>Click to edit Master title style</a:t>
             </a:r>
             <a:endParaRPr lang="en-US" dirty="0"/>
@@ -1693,7 +1698,7 @@
           <a:p>
             <a:pPr lvl="0"/>
             <a:r>
-              <a:rPr lang="en-US" noProof="0" smtClean="0"/>
+              <a:rPr lang="en-US" noProof="0"/>
               <a:t>Click icon to add picture</a:t>
             </a:r>
             <a:endParaRPr lang="en-GB" noProof="0" dirty="0"/>
@@ -1749,35 +1754,35 @@
           <a:p>
             <a:pPr lvl="0"/>
             <a:r>
-              <a:rPr lang="en-US" smtClean="0"/>
+              <a:rPr lang="en-US"/>
               <a:t>Edit Master text styles</a:t>
             </a:r>
           </a:p>
           <a:p>
             <a:pPr lvl="1"/>
             <a:r>
-              <a:rPr lang="en-US" smtClean="0"/>
+              <a:rPr lang="en-US"/>
               <a:t>Second level</a:t>
             </a:r>
           </a:p>
           <a:p>
             <a:pPr lvl="2"/>
             <a:r>
-              <a:rPr lang="en-US" smtClean="0"/>
+              <a:rPr lang="en-US"/>
               <a:t>Third level</a:t>
             </a:r>
           </a:p>
           <a:p>
             <a:pPr lvl="3"/>
             <a:r>
-              <a:rPr lang="en-US" smtClean="0"/>
+              <a:rPr lang="en-US"/>
               <a:t>Fourth level</a:t>
             </a:r>
           </a:p>
           <a:p>
             <a:pPr lvl="4"/>
             <a:r>
-              <a:rPr lang="en-US" smtClean="0"/>
+              <a:rPr lang="en-US"/>
               <a:t>Fifth level</a:t>
             </a:r>
             <a:endParaRPr lang="en-US" dirty="0"/>
@@ -1881,7 +1886,7 @@
           </a:lstStyle>
           <a:p>
             <a:r>
-              <a:rPr lang="en-US" smtClean="0"/>
+              <a:rPr lang="en-US"/>
               <a:t>Click to edit Master title style</a:t>
             </a:r>
             <a:endParaRPr lang="en-US" dirty="0"/>
@@ -1937,35 +1942,35 @@
           <a:p>
             <a:pPr lvl="0"/>
             <a:r>
-              <a:rPr lang="en-US" smtClean="0"/>
+              <a:rPr lang="en-US"/>
               <a:t>Edit Master text styles</a:t>
             </a:r>
           </a:p>
           <a:p>
             <a:pPr lvl="1"/>
             <a:r>
-              <a:rPr lang="en-US" smtClean="0"/>
+              <a:rPr lang="en-US"/>
               <a:t>Second level</a:t>
             </a:r>
           </a:p>
           <a:p>
             <a:pPr lvl="2"/>
             <a:r>
-              <a:rPr lang="en-US" smtClean="0"/>
+              <a:rPr lang="en-US"/>
               <a:t>Third level</a:t>
             </a:r>
           </a:p>
           <a:p>
             <a:pPr lvl="3"/>
             <a:r>
-              <a:rPr lang="en-US" smtClean="0"/>
+              <a:rPr lang="en-US"/>
               <a:t>Fourth level</a:t>
             </a:r>
           </a:p>
           <a:p>
             <a:pPr lvl="4"/>
             <a:r>
-              <a:rPr lang="en-US" smtClean="0"/>
+              <a:rPr lang="en-US"/>
               <a:t>Fifth level</a:t>
             </a:r>
             <a:endParaRPr lang="en-US" dirty="0"/>
@@ -2046,7 +2051,7 @@
           </a:lstStyle>
           <a:p>
             <a:r>
-              <a:rPr lang="en-US" smtClean="0"/>
+              <a:rPr lang="en-US"/>
               <a:t>Click to edit Master title style</a:t>
             </a:r>
             <a:endParaRPr lang="en-US" dirty="0"/>
@@ -2120,7 +2125,7 @@
           </a:lstStyle>
           <a:p>
             <a:r>
-              <a:rPr lang="en-US" smtClean="0"/>
+              <a:rPr lang="en-US"/>
               <a:t>Click to edit Master subtitle style</a:t>
             </a:r>
             <a:endParaRPr lang="en-US" dirty="0"/>
@@ -2173,7 +2178,7 @@
           <a:lstStyle/>
           <a:p>
             <a:r>
-              <a:rPr lang="en-US" dirty="0" smtClean="0"/>
+              <a:rPr lang="en-US" dirty="0"/>
               <a:t>Click to edit Master title style</a:t>
             </a:r>
             <a:endParaRPr lang="en-GB" dirty="0"/>
@@ -2197,35 +2202,35 @@
           <a:p>
             <a:pPr lvl="0"/>
             <a:r>
-              <a:rPr lang="en-US" smtClean="0"/>
+              <a:rPr lang="en-US"/>
               <a:t>Click to edit Master text styles</a:t>
             </a:r>
           </a:p>
           <a:p>
             <a:pPr lvl="1"/>
             <a:r>
-              <a:rPr lang="en-US" smtClean="0"/>
+              <a:rPr lang="en-US"/>
               <a:t>Second level</a:t>
             </a:r>
           </a:p>
           <a:p>
             <a:pPr lvl="2"/>
             <a:r>
-              <a:rPr lang="en-US" smtClean="0"/>
+              <a:rPr lang="en-US"/>
               <a:t>Third level</a:t>
             </a:r>
           </a:p>
           <a:p>
             <a:pPr lvl="3"/>
             <a:r>
-              <a:rPr lang="en-US" smtClean="0"/>
+              <a:rPr lang="en-US"/>
               <a:t>Fourth level</a:t>
             </a:r>
           </a:p>
           <a:p>
             <a:pPr lvl="4"/>
             <a:r>
-              <a:rPr lang="en-US" smtClean="0"/>
+              <a:rPr lang="en-US"/>
               <a:t>Fifth level</a:t>
             </a:r>
             <a:endParaRPr lang="en-GB"/>
@@ -2264,7 +2269,7 @@
               <a:pPr>
                 <a:defRPr/>
               </a:pPr>
-              <a:t>09/10/2018</a:t>
+              <a:t>15/10/2021</a:t>
             </a:fld>
             <a:endParaRPr lang="en-GB"/>
           </a:p>
@@ -2595,35 +2600,35 @@
           <a:p>
             <a:pPr lvl="0"/>
             <a:r>
-              <a:rPr lang="en-US" altLang="en-US" smtClean="0"/>
+              <a:rPr lang="en-US" altLang="en-US"/>
               <a:t>Edit Master text styles</a:t>
             </a:r>
           </a:p>
           <a:p>
             <a:pPr lvl="1"/>
             <a:r>
-              <a:rPr lang="en-US" altLang="en-US" smtClean="0"/>
+              <a:rPr lang="en-US" altLang="en-US"/>
               <a:t>Second level</a:t>
             </a:r>
           </a:p>
           <a:p>
             <a:pPr lvl="2"/>
             <a:r>
-              <a:rPr lang="en-US" altLang="en-US" smtClean="0"/>
+              <a:rPr lang="en-US" altLang="en-US"/>
               <a:t>Third level</a:t>
             </a:r>
           </a:p>
           <a:p>
             <a:pPr lvl="3"/>
             <a:r>
-              <a:rPr lang="en-US" altLang="en-US" smtClean="0"/>
+              <a:rPr lang="en-US" altLang="en-US"/>
               <a:t>Fourth level</a:t>
             </a:r>
           </a:p>
           <a:p>
             <a:pPr lvl="4"/>
             <a:r>
-              <a:rPr lang="en-US" altLang="en-US" smtClean="0"/>
+              <a:rPr lang="en-US" altLang="en-US"/>
               <a:t>Fifth level</a:t>
             </a:r>
           </a:p>
@@ -2837,10 +2842,10 @@
           <a:p>
             <a:pPr lvl="0"/>
             <a:r>
-              <a:rPr lang="en-US" altLang="en-US" smtClean="0"/>
+              <a:rPr lang="en-US" altLang="en-US"/>
               <a:t>Click to edit Master title style</a:t>
             </a:r>
-            <a:endParaRPr lang="en-GB" altLang="en-US" smtClean="0"/>
+            <a:endParaRPr lang="en-GB" altLang="en-US"/>
           </a:p>
         </p:txBody>
       </p:sp>
@@ -3392,7 +3397,7 @@
           <a:lstStyle/>
           <a:p>
             <a:r>
-              <a:rPr lang="en-GB" altLang="en-US" smtClean="0"/>
+              <a:rPr lang="en-GB" altLang="en-US"/>
               <a:t>Python</a:t>
             </a:r>
           </a:p>
@@ -3419,39 +3424,39 @@
           <a:lstStyle/>
           <a:p>
             <a:r>
-              <a:rPr lang="en-GB" altLang="en-US" smtClean="0"/>
+              <a:rPr lang="en-GB" altLang="en-US"/>
               <a:t>Common operators: </a:t>
             </a:r>
             <a:r>
-              <a:rPr lang="en-GB" altLang="en-US" smtClean="0">
+              <a:rPr lang="en-GB" altLang="en-US">
                 <a:latin typeface="Courier New" panose="02070309020205020404" pitchFamily="49" charset="0"/>
                 <a:cs typeface="Courier New" panose="02070309020205020404" pitchFamily="49" charset="0"/>
               </a:rPr>
               <a:t>and</a:t>
             </a:r>
             <a:r>
-              <a:rPr lang="en-GB" altLang="en-US" smtClean="0"/>
+              <a:rPr lang="en-GB" altLang="en-US"/>
               <a:t>, </a:t>
             </a:r>
             <a:r>
-              <a:rPr lang="en-GB" altLang="en-US" smtClean="0">
+              <a:rPr lang="en-GB" altLang="en-US">
                 <a:latin typeface="Courier New" panose="02070309020205020404" pitchFamily="49" charset="0"/>
                 <a:cs typeface="Courier New" panose="02070309020205020404" pitchFamily="49" charset="0"/>
               </a:rPr>
               <a:t>not</a:t>
             </a:r>
             <a:r>
-              <a:rPr lang="en-GB" altLang="en-US" smtClean="0"/>
+              <a:rPr lang="en-GB" altLang="en-US"/>
               <a:t> and </a:t>
             </a:r>
             <a:r>
-              <a:rPr lang="en-GB" altLang="en-US" smtClean="0">
+              <a:rPr lang="en-GB" altLang="en-US">
                 <a:latin typeface="Courier New" panose="02070309020205020404" pitchFamily="49" charset="0"/>
                 <a:cs typeface="Courier New" panose="02070309020205020404" pitchFamily="49" charset="0"/>
               </a:rPr>
               <a:t>or</a:t>
             </a:r>
-            <a:endParaRPr lang="en-GB" altLang="en-US" smtClean="0"/>
+            <a:endParaRPr lang="en-GB" altLang="en-US"/>
           </a:p>
         </p:txBody>
       </p:sp>
@@ -3686,7 +3691,7 @@
               <a:buNone/>
             </a:pPr>
             <a:r>
-              <a:rPr lang="en-US" altLang="en-US" sz="2400">
+              <a:rPr lang="en-US" altLang="en-US" sz="2400" dirty="0">
                 <a:cs typeface="Courier New" panose="02070309020205020404" pitchFamily="49" charset="0"/>
               </a:rPr>
               <a:t>Can be used to see if variable not in a collection:</a:t>
@@ -3698,7 +3703,7 @@
               <a:buNone/>
             </a:pPr>
             <a:r>
-              <a:rPr lang="en-US" altLang="en-US" sz="2000">
+              <a:rPr lang="en-US" altLang="en-US" sz="2000" dirty="0">
                 <a:latin typeface="Courier New" panose="02070309020205020404" pitchFamily="49" charset="0"/>
                 <a:cs typeface="Courier New" panose="02070309020205020404" pitchFamily="49" charset="0"/>
               </a:rPr>
@@ -3711,28 +3716,28 @@
               <a:buNone/>
             </a:pPr>
             <a:r>
-              <a:rPr lang="en-US" altLang="en-US" sz="2000" b="1">
+              <a:rPr lang="en-US" altLang="en-US" sz="2000" b="1" dirty="0">
                 <a:latin typeface="Courier New" panose="02070309020205020404" pitchFamily="49" charset="0"/>
                 <a:cs typeface="Courier New" panose="02070309020205020404" pitchFamily="49" charset="0"/>
               </a:rPr>
               <a:t>if</a:t>
             </a:r>
             <a:r>
-              <a:rPr lang="en-US" altLang="en-US" sz="2000">
+              <a:rPr lang="en-US" altLang="en-US" sz="2000" dirty="0">
                 <a:latin typeface="Courier New" panose="02070309020205020404" pitchFamily="49" charset="0"/>
                 <a:cs typeface="Courier New" panose="02070309020205020404" pitchFamily="49" charset="0"/>
               </a:rPr>
               <a:t> x </a:t>
             </a:r>
             <a:r>
-              <a:rPr lang="en-US" altLang="en-US" sz="2000" b="1">
+              <a:rPr lang="en-US" altLang="en-US" sz="2000" b="1" dirty="0">
                 <a:latin typeface="Courier New" panose="02070309020205020404" pitchFamily="49" charset="0"/>
                 <a:cs typeface="Courier New" panose="02070309020205020404" pitchFamily="49" charset="0"/>
               </a:rPr>
               <a:t>not in </a:t>
             </a:r>
             <a:r>
-              <a:rPr lang="en-US" altLang="en-US" sz="2000">
+              <a:rPr lang="en-US" altLang="en-US" sz="2000" dirty="0">
                 <a:latin typeface="Courier New" panose="02070309020205020404" pitchFamily="49" charset="0"/>
                 <a:cs typeface="Courier New" panose="02070309020205020404" pitchFamily="49" charset="0"/>
               </a:rPr>
@@ -3745,14 +3750,14 @@
               <a:buNone/>
             </a:pPr>
             <a:r>
-              <a:rPr lang="en-US" altLang="en-US" sz="2000" b="1">
+              <a:rPr lang="en-US" altLang="en-US" sz="2000" b="1" dirty="0">
                 <a:latin typeface="Courier New" panose="02070309020205020404" pitchFamily="49" charset="0"/>
                 <a:cs typeface="Courier New" panose="02070309020205020404" pitchFamily="49" charset="0"/>
               </a:rPr>
               <a:t>    print</a:t>
             </a:r>
             <a:r>
-              <a:rPr lang="en-US" altLang="en-US" sz="2000">
+              <a:rPr lang="en-US" altLang="en-US" sz="2000" dirty="0">
                 <a:latin typeface="Courier New" panose="02070309020205020404" pitchFamily="49" charset="0"/>
                 <a:cs typeface="Courier New" panose="02070309020205020404" pitchFamily="49" charset="0"/>
               </a:rPr>
@@ -3765,7 +3770,7 @@
               <a:buNone/>
             </a:pPr>
             <a:r>
-              <a:rPr lang="en-US" altLang="en-US" sz="2000" i="1">
+              <a:rPr lang="en-US" altLang="en-US" sz="2000" i="1" dirty="0">
                 <a:solidFill>
                   <a:srgbClr val="006600"/>
                 </a:solidFill>
@@ -3779,7 +3784,7 @@
               <a:buFont typeface="Arial" panose="020B0604020202020204" pitchFamily="34" charset="0"/>
               <a:buNone/>
             </a:pPr>
-            <a:endParaRPr lang="en-US" altLang="en-US" sz="2000" i="1">
+            <a:endParaRPr lang="en-US" altLang="en-US" sz="2000" i="1" dirty="0">
               <a:solidFill>
                 <a:srgbClr val="006600"/>
               </a:solidFill>
@@ -3792,25 +3797,12 @@
               <a:buNone/>
             </a:pPr>
             <a:r>
-              <a:rPr lang="en-US" altLang="en-US" sz="2400">
-                <a:cs typeface="Courier New" panose="02070309020205020404" pitchFamily="49" charset="0"/>
-              </a:rPr>
-              <a:t>Can even write </a:t>
-            </a:r>
-            <a:r>
-              <a:rPr lang="en-US" altLang="en-US" sz="2400">
-                <a:latin typeface="Courier New" panose="02070309020205020404" pitchFamily="49" charset="0"/>
-                <a:cs typeface="Courier New" panose="02070309020205020404" pitchFamily="49" charset="0"/>
-              </a:rPr>
-              <a:t>is not</a:t>
-            </a:r>
-            <a:r>
-              <a:rPr lang="en-US" altLang="en-US" sz="2400">
-                <a:cs typeface="Courier New" panose="02070309020205020404" pitchFamily="49" charset="0"/>
-              </a:rPr>
-              <a:t> to compare:</a:t>
-            </a:r>
-            <a:endParaRPr lang="en-US" altLang="en-US" sz="2000">
+              <a:rPr lang="en-US" altLang="en-US" sz="2400" dirty="0">
+                <a:cs typeface="Courier New" panose="02070309020205020404" pitchFamily="49" charset="0"/>
+              </a:rPr>
+              <a:t>Can be used to reverse Boolean logic:</a:t>
+            </a:r>
+            <a:endParaRPr lang="en-US" altLang="en-US" sz="2000" dirty="0">
               <a:latin typeface="Courier New" panose="02070309020205020404" pitchFamily="49" charset="0"/>
               <a:cs typeface="Courier New" panose="02070309020205020404" pitchFamily="49" charset="0"/>
             </a:endParaRPr>
@@ -3821,28 +3813,28 @@
               <a:buNone/>
             </a:pPr>
             <a:r>
-              <a:rPr lang="en-US" altLang="en-US" sz="2000" b="1">
-                <a:latin typeface="Courier New" panose="02070309020205020404" pitchFamily="49" charset="0"/>
-                <a:cs typeface="Courier New" panose="02070309020205020404" pitchFamily="49" charset="0"/>
-              </a:rPr>
-              <a:t>if</a:t>
-            </a:r>
-            <a:r>
-              <a:rPr lang="en-US" altLang="en-US" sz="2000">
+              <a:rPr lang="en-US" altLang="en-US" sz="2000" b="1" dirty="0">
+                <a:latin typeface="Courier New" panose="02070309020205020404" pitchFamily="49" charset="0"/>
+                <a:cs typeface="Courier New" panose="02070309020205020404" pitchFamily="49" charset="0"/>
+              </a:rPr>
+              <a:t>if not</a:t>
+            </a:r>
+            <a:r>
+              <a:rPr lang="en-US" altLang="en-US" sz="2000" dirty="0">
                 <a:latin typeface="Courier New" panose="02070309020205020404" pitchFamily="49" charset="0"/>
                 <a:cs typeface="Courier New" panose="02070309020205020404" pitchFamily="49" charset="0"/>
               </a:rPr>
               <a:t> x </a:t>
             </a:r>
             <a:r>
-              <a:rPr lang="en-US" altLang="en-US" sz="2000" b="1">
-                <a:latin typeface="Courier New" panose="02070309020205020404" pitchFamily="49" charset="0"/>
-                <a:cs typeface="Courier New" panose="02070309020205020404" pitchFamily="49" charset="0"/>
-              </a:rPr>
-              <a:t>is not </a:t>
-            </a:r>
-            <a:r>
-              <a:rPr lang="en-US" altLang="en-US" sz="2000">
+              <a:rPr lang="en-US" altLang="en-US" sz="2000" b="1" dirty="0">
+                <a:latin typeface="Courier New" panose="02070309020205020404" pitchFamily="49" charset="0"/>
+                <a:cs typeface="Courier New" panose="02070309020205020404" pitchFamily="49" charset="0"/>
+              </a:rPr>
+              <a:t>== </a:t>
+            </a:r>
+            <a:r>
+              <a:rPr lang="en-US" altLang="en-US" sz="2000" dirty="0">
                 <a:latin typeface="Courier New" panose="02070309020205020404" pitchFamily="49" charset="0"/>
                 <a:cs typeface="Courier New" panose="02070309020205020404" pitchFamily="49" charset="0"/>
               </a:rPr>
@@ -3855,14 +3847,14 @@
               <a:buNone/>
             </a:pPr>
             <a:r>
-              <a:rPr lang="en-US" altLang="en-US" sz="2000" b="1">
+              <a:rPr lang="en-US" altLang="en-US" sz="2000" b="1" dirty="0">
                 <a:latin typeface="Courier New" panose="02070309020205020404" pitchFamily="49" charset="0"/>
                 <a:cs typeface="Courier New" panose="02070309020205020404" pitchFamily="49" charset="0"/>
               </a:rPr>
               <a:t>    print</a:t>
             </a:r>
             <a:r>
-              <a:rPr lang="en-US" altLang="en-US" sz="2000">
+              <a:rPr lang="en-US" altLang="en-US" sz="2000" dirty="0">
                 <a:latin typeface="Courier New" panose="02070309020205020404" pitchFamily="49" charset="0"/>
                 <a:cs typeface="Courier New" panose="02070309020205020404" pitchFamily="49" charset="0"/>
               </a:rPr>
@@ -3875,7 +3867,7 @@
               <a:buNone/>
             </a:pPr>
             <a:r>
-              <a:rPr lang="en-US" altLang="en-US" sz="2000" i="1">
+              <a:rPr lang="en-US" altLang="en-US" sz="2000" i="1" dirty="0">
                 <a:solidFill>
                   <a:srgbClr val="006600"/>
                 </a:solidFill>
@@ -3889,7 +3881,7 @@
               <a:buFont typeface="Arial" panose="020B0604020202020204" pitchFamily="34" charset="0"/>
               <a:buNone/>
             </a:pPr>
-            <a:endParaRPr lang="en-US" altLang="en-US" sz="2000" i="1">
+            <a:endParaRPr lang="en-US" altLang="en-US" sz="2000" i="1" dirty="0">
               <a:latin typeface="Courier New" panose="02070309020205020404" pitchFamily="49" charset="0"/>
               <a:cs typeface="Courier New" panose="02070309020205020404" pitchFamily="49" charset="0"/>
             </a:endParaRPr>
@@ -3899,7 +3891,7 @@
               <a:buFont typeface="Arial" panose="020B0604020202020204" pitchFamily="34" charset="0"/>
               <a:buNone/>
             </a:pPr>
-            <a:endParaRPr lang="en-US" altLang="en-US" sz="2400">
+            <a:endParaRPr lang="en-US" altLang="en-US" sz="2400" dirty="0">
               <a:latin typeface="Courier New" panose="02070309020205020404" pitchFamily="49" charset="0"/>
               <a:cs typeface="Courier New" panose="02070309020205020404" pitchFamily="49" charset="0"/>
             </a:endParaRPr>
@@ -4136,13 +4128,6 @@
   <p:clrMapOvr>
     <a:masterClrMapping/>
   </p:clrMapOvr>
-  <p:timing>
-    <p:tnLst>
-      <p:par>
-        <p:cTn id="1" dur="indefinite" restart="never" nodeType="tmRoot"/>
-      </p:par>
-    </p:tnLst>
-  </p:timing>
 </p:sld>
 </file>
 
@@ -4848,13 +4833,6 @@
   <p:clrMapOvr>
     <a:masterClrMapping/>
   </p:clrMapOvr>
-  <p:timing>
-    <p:tnLst>
-      <p:par>
-        <p:cTn id="1" dur="indefinite" restart="never" nodeType="tmRoot"/>
-      </p:par>
-    </p:tnLst>
-  </p:timing>
 </p:sld>
 </file>
 
@@ -5479,13 +5457,6 @@
   <p:clrMapOvr>
     <a:masterClrMapping/>
   </p:clrMapOvr>
-  <p:timing>
-    <p:tnLst>
-      <p:par>
-        <p:cTn id="1" dur="indefinite" restart="never" nodeType="tmRoot"/>
-      </p:par>
-    </p:tnLst>
-  </p:timing>
 </p:sld>
 </file>
 
@@ -5960,13 +5931,6 @@
   <p:clrMapOvr>
     <a:masterClrMapping/>
   </p:clrMapOvr>
-  <p:timing>
-    <p:tnLst>
-      <p:par>
-        <p:cTn id="1" dur="indefinite" restart="never" nodeType="tmRoot"/>
-      </p:par>
-    </p:tnLst>
-  </p:timing>
 </p:sld>
 </file>
 
@@ -6735,13 +6699,6 @@
   <p:clrMapOvr>
     <a:masterClrMapping/>
   </p:clrMapOvr>
-  <p:timing>
-    <p:tnLst>
-      <p:par>
-        <p:cTn id="1" dur="indefinite" restart="never" nodeType="tmRoot"/>
-      </p:par>
-    </p:tnLst>
-  </p:timing>
 </p:sld>
 </file>
 
@@ -7555,13 +7512,6 @@
   <p:clrMapOvr>
     <a:masterClrMapping/>
   </p:clrMapOvr>
-  <p:timing>
-    <p:tnLst>
-      <p:par>
-        <p:cTn id="1" dur="indefinite" restart="never" nodeType="tmRoot"/>
-      </p:par>
-    </p:tnLst>
-  </p:timing>
 </p:sld>
 </file>
 
@@ -8249,13 +8199,6 @@
   <p:clrMapOvr>
     <a:masterClrMapping/>
   </p:clrMapOvr>
-  <p:timing>
-    <p:tnLst>
-      <p:par>
-        <p:cTn id="1" dur="indefinite" restart="never" nodeType="tmRoot"/>
-      </p:par>
-    </p:tnLst>
-  </p:timing>
 </p:sld>
 </file>
 
@@ -9095,13 +9038,6 @@
   <p:clrMapOvr>
     <a:masterClrMapping/>
   </p:clrMapOvr>
-  <p:timing>
-    <p:tnLst>
-      <p:par>
-        <p:cTn id="1" dur="indefinite" restart="never" nodeType="tmRoot"/>
-      </p:par>
-    </p:tnLst>
-  </p:timing>
 </p:sld>
 </file>
 
@@ -9713,13 +9649,6 @@
   <p:clrMapOvr>
     <a:masterClrMapping/>
   </p:clrMapOvr>
-  <p:timing>
-    <p:tnLst>
-      <p:par>
-        <p:cTn id="1" dur="indefinite" restart="never" nodeType="tmRoot"/>
-      </p:par>
-    </p:tnLst>
-  </p:timing>
 </p:sld>
 </file>
 
@@ -10347,13 +10276,6 @@
   <p:clrMapOvr>
     <a:masterClrMapping/>
   </p:clrMapOvr>
-  <p:timing>
-    <p:tnLst>
-      <p:par>
-        <p:cTn id="1" dur="indefinite" restart="never" nodeType="tmRoot"/>
-      </p:par>
-    </p:tnLst>
-  </p:timing>
 </p:sld>
 </file>
 
@@ -10969,13 +10891,6 @@
   <p:clrMapOvr>
     <a:masterClrMapping/>
   </p:clrMapOvr>
-  <p:timing>
-    <p:tnLst>
-      <p:par>
-        <p:cTn id="1" dur="indefinite" restart="never" nodeType="tmRoot"/>
-      </p:par>
-    </p:tnLst>
-  </p:timing>
 </p:sld>
 </file>
 

</xml_diff>